<commit_message>
Update PSet Final HashingQuiz.pptx
</commit_message>
<xml_diff>
--- a/ppts/PSet Final HashingQuiz.pptx
+++ b/ppts/PSet Final HashingQuiz.pptx
@@ -23830,9 +23830,6 @@
               </a:rPr>
               <a:t> </a:t>
             </a:r>
-            <a:endParaRPr lang="en-US" altLang="ko-KR" sz="1400" dirty="0" smtClean="0">
-              <a:latin typeface="+mn-ea"/>
-            </a:endParaRPr>
           </a:p>
           <a:p>
             <a:pPr fontAlgn="base">
@@ -23856,17 +23853,8 @@
               <a:rPr lang="en-US" altLang="ko-KR" sz="1400" dirty="0" smtClean="0">
                 <a:latin typeface="+mn-ea"/>
               </a:rPr>
-              <a:t>(13) </a:t>
-            </a:r>
-            <a:r>
-              <a:rPr lang="en-US" altLang="ko-KR" sz="1400" dirty="0" smtClean="0">
-                <a:latin typeface="+mn-ea"/>
-              </a:rPr>
-              <a:t>= </a:t>
-            </a:r>
-            <a:endParaRPr lang="en-US" altLang="ko-KR" sz="1400" dirty="0" smtClean="0">
-              <a:latin typeface="+mn-ea"/>
-            </a:endParaRPr>
+              <a:t>(13) = </a:t>
+            </a:r>
           </a:p>
           <a:p>
             <a:r>
@@ -24370,7 +24358,15 @@
             <a:pPr algn="ctr"/>
             <a:r>
               <a:rPr lang="en-US" altLang="ko-KR" sz="2000" dirty="0" smtClean="0"/>
-              <a:t>h'(x) = x % 7</a:t>
+              <a:t>h'(x) = x </a:t>
+            </a:r>
+            <a:r>
+              <a:rPr lang="en-US" altLang="ko-KR" sz="2000" smtClean="0"/>
+              <a:t>% </a:t>
+            </a:r>
+            <a:r>
+              <a:rPr lang="en-US" altLang="ko-KR" sz="2000" smtClean="0"/>
+              <a:t>5</a:t>
             </a:r>
             <a:endParaRPr lang="en-US" altLang="ko-KR" sz="2000" dirty="0"/>
           </a:p>
@@ -24412,15 +24408,11 @@
             <a:pPr algn="ctr"/>
             <a:r>
               <a:rPr lang="en-US" altLang="ko-KR" sz="2000" dirty="0" smtClean="0"/>
-              <a:t>h(x) </a:t>
-            </a:r>
-            <a:r>
-              <a:rPr lang="en-US" altLang="ko-KR" sz="2000" smtClean="0"/>
-              <a:t>= x % </a:t>
+              <a:t>h(x) = x % </a:t>
             </a:r>
             <a:r>
               <a:rPr lang="en-US" altLang="ko-KR" sz="2000" dirty="0" smtClean="0"/>
-              <a:t>10</a:t>
+              <a:t>7</a:t>
             </a:r>
             <a:endParaRPr lang="en-US" altLang="ko-KR" sz="2000" dirty="0"/>
           </a:p>

</xml_diff>